<commit_message>
Some information about threats to auth code flow
</commit_message>
<xml_diff>
--- a/fdd_jogieglo.pptx
+++ b/fdd_jogieglo.pptx
@@ -14,6 +14,9 @@
     <p:sldId id="260" r:id="rId9"/>
     <p:sldId id="261" r:id="rId10"/>
     <p:sldId id="262" r:id="rId11"/>
+    <p:sldId id="263" r:id="rId12"/>
+    <p:sldId id="264" r:id="rId13"/>
+    <p:sldId id="265" r:id="rId14"/>
   </p:sldIdLst>
   <p:sldSz cx="6858000" cy="5143500"/>
   <p:notesSz cx="7559675" cy="10691812"/>
@@ -4428,16 +4431,7 @@
                 </a:solidFill>
                 <a:latin typeface="Calibri"/>
               </a:rPr>
-              <a:t>Click to edit the outline text </a:t>
-            </a:r>
-            <a:r>
-              <a:rPr b="0" lang="pl-PL" sz="3200" spc="-1" strike="noStrike">
-                <a:solidFill>
-                  <a:srgbClr val="000000"/>
-                </a:solidFill>
-                <a:latin typeface="Calibri"/>
-              </a:rPr>
-              <a:t>format</a:t>
+              <a:t>Click to edit the outline text format</a:t>
             </a:r>
             <a:endParaRPr b="0" lang="pl-PL" sz="3200" spc="-1" strike="noStrike">
               <a:solidFill>
@@ -5266,6 +5260,152 @@
 </p:sld>
 </file>
 
+<file path=ppt/slides/slide10.xml><?xml version="1.0" encoding="utf-8"?>
+<p:sld xmlns:a="http://schemas.openxmlformats.org/drawingml/2006/main" xmlns:p="http://schemas.openxmlformats.org/presentationml/2006/main" xmlns:r="http://schemas.openxmlformats.org/officeDocument/2006/relationships" xmlns:p14="http://schemas.microsoft.com/office/powerpoint/2010/main" xmlns:p15="http://schemas.microsoft.com/office/powerpoint/2012/main" xmlns:mc="http://schemas.openxmlformats.org/markup-compatibility/2006">
+  <p:cSld>
+    <p:spTree>
+      <p:nvGrpSpPr>
+        <p:cNvPr id="1" name=""/>
+        <p:cNvGrpSpPr/>
+        <p:nvPr/>
+      </p:nvGrpSpPr>
+      <p:grpSpPr>
+        <a:xfrm>
+          <a:off x="0" y="0"/>
+          <a:ext cx="0" cy="0"/>
+          <a:chOff x="0" y="0"/>
+          <a:chExt cx="0" cy="0"/>
+        </a:xfrm>
+      </p:grpSpPr>
+      <p:sp>
+        <p:nvSpPr>
+          <p:cNvPr id="136" name="TextShape 1"/>
+          <p:cNvSpPr txBox="1"/>
+          <p:nvPr/>
+        </p:nvSpPr>
+        <p:spPr>
+          <a:xfrm>
+            <a:off x="1295640" y="3579840"/>
+            <a:ext cx="4320000" cy="463680"/>
+          </a:xfrm>
+          <a:prstGeom prst="rect">
+            <a:avLst/>
+          </a:prstGeom>
+          <a:noFill/>
+          <a:ln>
+            <a:noFill/>
+          </a:ln>
+        </p:spPr>
+        <p:txBody>
+          <a:bodyPr anchor="b">
+            <a:normAutofit/>
+          </a:bodyPr>
+          <a:p>
+            <a:endParaRPr b="0" lang="pl-PL" sz="3200" spc="-1" strike="noStrike">
+              <a:solidFill>
+                <a:srgbClr val="000000"/>
+              </a:solidFill>
+              <a:latin typeface="Calibri"/>
+            </a:endParaRPr>
+          </a:p>
+        </p:txBody>
+      </p:sp>
+      <p:sp>
+        <p:nvSpPr>
+          <p:cNvPr id="137" name="TextShape 2"/>
+          <p:cNvSpPr txBox="1"/>
+          <p:nvPr/>
+        </p:nvSpPr>
+        <p:spPr>
+          <a:xfrm>
+            <a:off x="836640" y="2355840"/>
+            <a:ext cx="5184360" cy="1151640"/>
+          </a:xfrm>
+          <a:prstGeom prst="rect">
+            <a:avLst/>
+          </a:prstGeom>
+          <a:noFill/>
+          <a:ln>
+            <a:noFill/>
+          </a:ln>
+        </p:spPr>
+        <p:txBody>
+          <a:bodyPr anchor="ctr"/>
+          <a:p>
+            <a:endParaRPr b="0" lang="pl-PL" sz="1800" spc="-1" strike="noStrike">
+              <a:solidFill>
+                <a:srgbClr val="000000"/>
+              </a:solidFill>
+              <a:latin typeface="Calibri"/>
+            </a:endParaRPr>
+          </a:p>
+        </p:txBody>
+      </p:sp>
+      <p:sp>
+        <p:nvSpPr>
+          <p:cNvPr id="138" name="TextShape 3"/>
+          <p:cNvSpPr txBox="1"/>
+          <p:nvPr/>
+        </p:nvSpPr>
+        <p:spPr>
+          <a:xfrm>
+            <a:off x="1278360" y="4155840"/>
+            <a:ext cx="4320000" cy="333720"/>
+          </a:xfrm>
+          <a:prstGeom prst="rect">
+            <a:avLst/>
+          </a:prstGeom>
+          <a:noFill/>
+          <a:ln>
+            <a:noFill/>
+          </a:ln>
+        </p:spPr>
+        <p:txBody>
+          <a:bodyPr anchor="b">
+            <a:normAutofit/>
+          </a:bodyPr>
+          <a:p>
+            <a:endParaRPr b="0" lang="pl-PL" sz="3200" spc="-1" strike="noStrike">
+              <a:solidFill>
+                <a:srgbClr val="000000"/>
+              </a:solidFill>
+              <a:latin typeface="Calibri"/>
+            </a:endParaRPr>
+          </a:p>
+        </p:txBody>
+      </p:sp>
+    </p:spTree>
+  </p:cSld>
+  <p:timing>
+    <p:tnLst>
+      <p:par>
+        <p:cTn id="19" dur="indefinite" restart="never" nodeType="tmRoot">
+          <p:childTnLst>
+            <p:seq>
+              <p:cTn id="20" dur="indefinite" nodeType="mainSeq"/>
+              <p:prevCondLst>
+                <p:cond delay="0" evt="onPrev">
+                  <p:tgtEl>
+                    <p:sldTgt/>
+                  </p:tgtEl>
+                </p:cond>
+              </p:prevCondLst>
+              <p:nextCondLst>
+                <p:cond delay="0" evt="onNext">
+                  <p:tgtEl>
+                    <p:sldTgt/>
+                  </p:tgtEl>
+                </p:cond>
+              </p:nextCondLst>
+            </p:seq>
+          </p:childTnLst>
+        </p:cTn>
+      </p:par>
+    </p:tnLst>
+  </p:timing>
+</p:sld>
+</file>
+
 <file path=ppt/slides/slide2.xml><?xml version="1.0" encoding="utf-8"?>
 <p:sld xmlns:a="http://schemas.openxmlformats.org/drawingml/2006/main" xmlns:p="http://schemas.openxmlformats.org/presentationml/2006/main" xmlns:r="http://schemas.openxmlformats.org/officeDocument/2006/relationships" xmlns:p14="http://schemas.microsoft.com/office/powerpoint/2010/main" xmlns:p15="http://schemas.microsoft.com/office/powerpoint/2012/main" xmlns:mc="http://schemas.openxmlformats.org/markup-compatibility/2006">
   <p:cSld>
@@ -5616,6 +5756,15 @@
         <p:txBody>
           <a:bodyPr lIns="0" rIns="0" tIns="0" bIns="0" anchor="ctr"/>
           <a:p>
+            <a:r>
+              <a:rPr b="0" lang="pl-PL" sz="1800" spc="-1" strike="noStrike">
+                <a:solidFill>
+                  <a:srgbClr val="000000"/>
+                </a:solidFill>
+                <a:latin typeface="Calibri"/>
+              </a:rPr>
+              <a:t>Implicit flow</a:t>
+            </a:r>
             <a:endParaRPr b="0" lang="pl-PL" sz="1800" spc="-1" strike="noStrike">
               <a:solidFill>
                 <a:srgbClr val="000000"/>
@@ -5728,31 +5877,64 @@
           </a:p>
         </p:txBody>
       </p:sp>
-      <p:pic>
-        <p:nvPicPr>
-          <p:cNvPr id="129" name="" descr=""/>
-          <p:cNvPicPr/>
+      <p:sp>
+        <p:nvSpPr>
+          <p:cNvPr id="129" name="TextShape 2"/>
+          <p:cNvSpPr txBox="1"/>
           <p:nvPr/>
-        </p:nvPicPr>
-        <p:blipFill>
-          <a:blip r:embed="rId1"/>
-          <a:stretch/>
-        </p:blipFill>
-        <p:spPr>
-          <a:xfrm>
-            <a:off x="360" y="1426680"/>
-            <a:ext cx="6857640" cy="3328200"/>
-          </a:xfrm>
-          <a:prstGeom prst="rect">
-            <a:avLst/>
-          </a:prstGeom>
+        </p:nvSpPr>
+        <p:spPr>
+          <a:xfrm>
+            <a:off x="365760" y="1447560"/>
+            <a:ext cx="6217920" cy="3490200"/>
+          </a:xfrm>
+          <a:prstGeom prst="rect">
+            <a:avLst/>
+          </a:prstGeom>
+          <a:noFill/>
           <a:ln>
             <a:noFill/>
           </a:ln>
         </p:spPr>
-      </p:pic>
+        <p:txBody>
+          <a:bodyPr lIns="0" rIns="0" tIns="0" bIns="0" anchor="ctr"/>
+          <a:p>
+            <a:pPr algn="ctr"/>
+            <a:endParaRPr b="0" lang="en-US" sz="3200" spc="-1" strike="noStrike">
+              <a:latin typeface="Arial"/>
+            </a:endParaRPr>
+          </a:p>
+        </p:txBody>
+      </p:sp>
     </p:spTree>
   </p:cSld>
+  <p:timing>
+    <p:tnLst>
+      <p:par>
+        <p:cTn id="11" dur="indefinite" restart="never" nodeType="tmRoot">
+          <p:childTnLst>
+            <p:seq>
+              <p:cTn id="12" dur="indefinite" nodeType="mainSeq"/>
+              <p:prevCondLst>
+                <p:cond delay="0" evt="onPrev">
+                  <p:tgtEl>
+                    <p:sldTgt/>
+                  </p:tgtEl>
+                </p:cond>
+              </p:prevCondLst>
+              <p:nextCondLst>
+                <p:cond delay="0" evt="onNext">
+                  <p:tgtEl>
+                    <p:sldTgt/>
+                  </p:tgtEl>
+                </p:cond>
+              </p:nextCondLst>
+            </p:seq>
+          </p:childTnLst>
+        </p:cTn>
+      </p:par>
+    </p:tnLst>
+  </p:timing>
 </p:sld>
 </file>
 
@@ -5781,8 +5963,8 @@
         </p:nvSpPr>
         <p:spPr>
           <a:xfrm>
-            <a:off x="1295640" y="3579840"/>
-            <a:ext cx="4320000" cy="463680"/>
+            <a:off x="342720" y="205200"/>
+            <a:ext cx="6171840" cy="858600"/>
           </a:xfrm>
           <a:prstGeom prst="rect">
             <a:avLst/>
@@ -5793,92 +5975,350 @@
           </a:ln>
         </p:spPr>
         <p:txBody>
-          <a:bodyPr anchor="b">
-            <a:normAutofit/>
-          </a:bodyPr>
-          <a:p>
-            <a:endParaRPr b="0" lang="pl-PL" sz="3200" spc="-1" strike="noStrike">
-              <a:solidFill>
-                <a:srgbClr val="000000"/>
-              </a:solidFill>
-              <a:latin typeface="Calibri"/>
-            </a:endParaRPr>
-          </a:p>
-        </p:txBody>
-      </p:sp>
-      <p:sp>
-        <p:nvSpPr>
-          <p:cNvPr id="131" name="TextShape 2"/>
-          <p:cNvSpPr txBox="1"/>
+          <a:bodyPr lIns="0" rIns="0" tIns="0" bIns="0" anchor="ctr"/>
+          <a:p>
+            <a:r>
+              <a:rPr b="0" lang="pl-PL" sz="1800" spc="-1" strike="noStrike">
+                <a:solidFill>
+                  <a:srgbClr val="000000"/>
+                </a:solidFill>
+                <a:latin typeface="Calibri"/>
+              </a:rPr>
+              <a:t>Auth code flow</a:t>
+            </a:r>
+            <a:endParaRPr b="0" lang="pl-PL" sz="1800" spc="-1" strike="noStrike">
+              <a:solidFill>
+                <a:srgbClr val="000000"/>
+              </a:solidFill>
+              <a:latin typeface="Calibri"/>
+            </a:endParaRPr>
+          </a:p>
+        </p:txBody>
+      </p:sp>
+      <p:pic>
+        <p:nvPicPr>
+          <p:cNvPr id="131" name="" descr=""/>
+          <p:cNvPicPr/>
           <p:nvPr/>
-        </p:nvSpPr>
-        <p:spPr>
-          <a:xfrm>
-            <a:off x="836640" y="2355840"/>
-            <a:ext cx="5184360" cy="1151640"/>
-          </a:xfrm>
-          <a:prstGeom prst="rect">
-            <a:avLst/>
-          </a:prstGeom>
-          <a:noFill/>
+        </p:nvPicPr>
+        <p:blipFill>
+          <a:blip r:embed="rId1"/>
+          <a:stretch/>
+        </p:blipFill>
+        <p:spPr>
+          <a:xfrm>
+            <a:off x="360" y="1426680"/>
+            <a:ext cx="6857640" cy="3328200"/>
+          </a:xfrm>
+          <a:prstGeom prst="rect">
+            <a:avLst/>
+          </a:prstGeom>
           <a:ln>
             <a:noFill/>
           </a:ln>
         </p:spPr>
-        <p:txBody>
-          <a:bodyPr anchor="ctr"/>
-          <a:p>
-            <a:endParaRPr b="0" lang="pl-PL" sz="1800" spc="-1" strike="noStrike">
-              <a:solidFill>
-                <a:srgbClr val="000000"/>
-              </a:solidFill>
-              <a:latin typeface="Calibri"/>
-            </a:endParaRPr>
-          </a:p>
-        </p:txBody>
-      </p:sp>
-      <p:sp>
-        <p:nvSpPr>
-          <p:cNvPr id="132" name="TextShape 3"/>
-          <p:cNvSpPr txBox="1"/>
-          <p:nvPr/>
-        </p:nvSpPr>
-        <p:spPr>
-          <a:xfrm>
-            <a:off x="1278360" y="4155840"/>
-            <a:ext cx="4320000" cy="333720"/>
-          </a:xfrm>
-          <a:prstGeom prst="rect">
-            <a:avLst/>
-          </a:prstGeom>
-          <a:noFill/>
-          <a:ln>
-            <a:noFill/>
-          </a:ln>
-        </p:spPr>
-        <p:txBody>
-          <a:bodyPr anchor="b">
-            <a:normAutofit/>
-          </a:bodyPr>
-          <a:p>
-            <a:endParaRPr b="0" lang="pl-PL" sz="3200" spc="-1" strike="noStrike">
-              <a:solidFill>
-                <a:srgbClr val="000000"/>
-              </a:solidFill>
-              <a:latin typeface="Calibri"/>
-            </a:endParaRPr>
-          </a:p>
-        </p:txBody>
-      </p:sp>
+      </p:pic>
     </p:spTree>
   </p:cSld>
   <p:timing>
     <p:tnLst>
       <p:par>
-        <p:cTn id="11" dur="indefinite" restart="never" nodeType="tmRoot">
+        <p:cTn id="13" dur="indefinite" restart="never" nodeType="tmRoot">
           <p:childTnLst>
             <p:seq>
-              <p:cTn id="12" dur="indefinite" nodeType="mainSeq"/>
+              <p:cTn id="14" dur="indefinite" nodeType="mainSeq"/>
+              <p:prevCondLst>
+                <p:cond delay="0" evt="onPrev">
+                  <p:tgtEl>
+                    <p:sldTgt/>
+                  </p:tgtEl>
+                </p:cond>
+              </p:prevCondLst>
+              <p:nextCondLst>
+                <p:cond delay="0" evt="onNext">
+                  <p:tgtEl>
+                    <p:sldTgt/>
+                  </p:tgtEl>
+                </p:cond>
+              </p:nextCondLst>
+            </p:seq>
+          </p:childTnLst>
+        </p:cTn>
+      </p:par>
+    </p:tnLst>
+  </p:timing>
+</p:sld>
+</file>
+
+<file path=ppt/slides/slide8.xml><?xml version="1.0" encoding="utf-8"?>
+<p:sld xmlns:a="http://schemas.openxmlformats.org/drawingml/2006/main" xmlns:p="http://schemas.openxmlformats.org/presentationml/2006/main" xmlns:r="http://schemas.openxmlformats.org/officeDocument/2006/relationships" xmlns:p14="http://schemas.microsoft.com/office/powerpoint/2010/main" xmlns:p15="http://schemas.microsoft.com/office/powerpoint/2012/main" xmlns:mc="http://schemas.openxmlformats.org/markup-compatibility/2006">
+  <p:cSld>
+    <p:spTree>
+      <p:nvGrpSpPr>
+        <p:cNvPr id="1" name=""/>
+        <p:cNvGrpSpPr/>
+        <p:nvPr/>
+      </p:nvGrpSpPr>
+      <p:grpSpPr>
+        <a:xfrm>
+          <a:off x="0" y="0"/>
+          <a:ext cx="0" cy="0"/>
+          <a:chOff x="0" y="0"/>
+          <a:chExt cx="0" cy="0"/>
+        </a:xfrm>
+      </p:grpSpPr>
+      <p:sp>
+        <p:nvSpPr>
+          <p:cNvPr id="132" name="TextShape 1"/>
+          <p:cNvSpPr txBox="1"/>
+          <p:nvPr/>
+        </p:nvSpPr>
+        <p:spPr>
+          <a:xfrm>
+            <a:off x="342720" y="205200"/>
+            <a:ext cx="6171840" cy="858600"/>
+          </a:xfrm>
+          <a:prstGeom prst="rect">
+            <a:avLst/>
+          </a:prstGeom>
+          <a:noFill/>
+          <a:ln>
+            <a:noFill/>
+          </a:ln>
+        </p:spPr>
+        <p:txBody>
+          <a:bodyPr lIns="0" rIns="0" tIns="0" bIns="0" anchor="ctr"/>
+          <a:p>
+            <a:endParaRPr b="0" lang="pl-PL" sz="1800" spc="-1" strike="noStrike">
+              <a:solidFill>
+                <a:srgbClr val="000000"/>
+              </a:solidFill>
+              <a:latin typeface="Calibri"/>
+            </a:endParaRPr>
+          </a:p>
+        </p:txBody>
+      </p:sp>
+      <p:sp>
+        <p:nvSpPr>
+          <p:cNvPr id="133" name="TextShape 2"/>
+          <p:cNvSpPr txBox="1"/>
+          <p:nvPr/>
+        </p:nvSpPr>
+        <p:spPr>
+          <a:xfrm>
+            <a:off x="373680" y="1448640"/>
+            <a:ext cx="6118560" cy="3397680"/>
+          </a:xfrm>
+          <a:prstGeom prst="rect">
+            <a:avLst/>
+          </a:prstGeom>
+          <a:noFill/>
+          <a:ln>
+            <a:noFill/>
+          </a:ln>
+        </p:spPr>
+        <p:txBody>
+          <a:bodyPr lIns="0" rIns="0" tIns="0" bIns="0">
+            <a:normAutofit/>
+          </a:bodyPr>
+          <a:p>
+            <a:pPr marL="432000" indent="-324000">
+              <a:spcBef>
+                <a:spcPts val="1417"/>
+              </a:spcBef>
+              <a:buClr>
+                <a:srgbClr val="000000"/>
+              </a:buClr>
+              <a:buSzPct val="45000"/>
+              <a:buFont typeface="Wingdings" charset="2"/>
+              <a:buChar char=""/>
+            </a:pPr>
+            <a:r>
+              <a:rPr b="0" lang="pl-PL" sz="3200" spc="-1" strike="noStrike">
+                <a:solidFill>
+                  <a:srgbClr val="000000"/>
+                </a:solidFill>
+                <a:latin typeface="Calibri"/>
+              </a:rPr>
+              <a:t>client_secret i token niewidoczne dla użytkownika</a:t>
+            </a:r>
+            <a:endParaRPr b="0" lang="pl-PL" sz="3200" spc="-1" strike="noStrike">
+              <a:solidFill>
+                <a:srgbClr val="000000"/>
+              </a:solidFill>
+              <a:latin typeface="Calibri"/>
+            </a:endParaRPr>
+          </a:p>
+          <a:p>
+            <a:pPr marL="432000" indent="-324000">
+              <a:spcBef>
+                <a:spcPts val="1417"/>
+              </a:spcBef>
+              <a:buClr>
+                <a:srgbClr val="000000"/>
+              </a:buClr>
+              <a:buSzPct val="45000"/>
+              <a:buFont typeface="Wingdings" charset="2"/>
+              <a:buChar char=""/>
+            </a:pPr>
+            <a:r>
+              <a:rPr b="0" lang="pl-PL" sz="3200" spc="-1" strike="noStrike">
+                <a:solidFill>
+                  <a:srgbClr val="000000"/>
+                </a:solidFill>
+                <a:latin typeface="Calibri"/>
+              </a:rPr>
+              <a:t>Zapobiega różnym atakom (wynikającym ze złej implementacji) (confused deputy problem)</a:t>
+            </a:r>
+            <a:endParaRPr b="0" lang="pl-PL" sz="3200" spc="-1" strike="noStrike">
+              <a:solidFill>
+                <a:srgbClr val="000000"/>
+              </a:solidFill>
+              <a:latin typeface="Calibri"/>
+            </a:endParaRPr>
+          </a:p>
+        </p:txBody>
+      </p:sp>
+    </p:spTree>
+  </p:cSld>
+  <p:timing>
+    <p:tnLst>
+      <p:par>
+        <p:cTn id="15" dur="indefinite" restart="never" nodeType="tmRoot">
+          <p:childTnLst>
+            <p:seq>
+              <p:cTn id="16" dur="indefinite" nodeType="mainSeq"/>
+              <p:prevCondLst>
+                <p:cond delay="0" evt="onPrev">
+                  <p:tgtEl>
+                    <p:sldTgt/>
+                  </p:tgtEl>
+                </p:cond>
+              </p:prevCondLst>
+              <p:nextCondLst>
+                <p:cond delay="0" evt="onNext">
+                  <p:tgtEl>
+                    <p:sldTgt/>
+                  </p:tgtEl>
+                </p:cond>
+              </p:nextCondLst>
+            </p:seq>
+          </p:childTnLst>
+        </p:cTn>
+      </p:par>
+    </p:tnLst>
+  </p:timing>
+</p:sld>
+</file>
+
+<file path=ppt/slides/slide9.xml><?xml version="1.0" encoding="utf-8"?>
+<p:sld xmlns:a="http://schemas.openxmlformats.org/drawingml/2006/main" xmlns:p="http://schemas.openxmlformats.org/presentationml/2006/main" xmlns:r="http://schemas.openxmlformats.org/officeDocument/2006/relationships" xmlns:p14="http://schemas.microsoft.com/office/powerpoint/2010/main" xmlns:p15="http://schemas.microsoft.com/office/powerpoint/2012/main" xmlns:mc="http://schemas.openxmlformats.org/markup-compatibility/2006">
+  <p:cSld>
+    <p:spTree>
+      <p:nvGrpSpPr>
+        <p:cNvPr id="1" name=""/>
+        <p:cNvGrpSpPr/>
+        <p:nvPr/>
+      </p:nvGrpSpPr>
+      <p:grpSpPr>
+        <a:xfrm>
+          <a:off x="0" y="0"/>
+          <a:ext cx="0" cy="0"/>
+          <a:chOff x="0" y="0"/>
+          <a:chExt cx="0" cy="0"/>
+        </a:xfrm>
+      </p:grpSpPr>
+      <p:sp>
+        <p:nvSpPr>
+          <p:cNvPr id="134" name="TextShape 1"/>
+          <p:cNvSpPr txBox="1"/>
+          <p:nvPr/>
+        </p:nvSpPr>
+        <p:spPr>
+          <a:xfrm>
+            <a:off x="342720" y="205200"/>
+            <a:ext cx="6171840" cy="858600"/>
+          </a:xfrm>
+          <a:prstGeom prst="rect">
+            <a:avLst/>
+          </a:prstGeom>
+          <a:noFill/>
+          <a:ln>
+            <a:noFill/>
+          </a:ln>
+        </p:spPr>
+        <p:txBody>
+          <a:bodyPr lIns="0" rIns="0" tIns="0" bIns="0" anchor="ctr"/>
+          <a:p>
+            <a:r>
+              <a:rPr b="0" lang="pl-PL" sz="1800" spc="-1" strike="noStrike">
+                <a:solidFill>
+                  <a:srgbClr val="000000"/>
+                </a:solidFill>
+                <a:latin typeface="Calibri"/>
+              </a:rPr>
+              <a:t>Zagrożenia</a:t>
+            </a:r>
+            <a:endParaRPr b="0" lang="pl-PL" sz="1800" spc="-1" strike="noStrike">
+              <a:solidFill>
+                <a:srgbClr val="000000"/>
+              </a:solidFill>
+              <a:latin typeface="Calibri"/>
+            </a:endParaRPr>
+          </a:p>
+        </p:txBody>
+      </p:sp>
+      <p:sp>
+        <p:nvSpPr>
+          <p:cNvPr id="135" name="TextShape 2"/>
+          <p:cNvSpPr txBox="1"/>
+          <p:nvPr/>
+        </p:nvSpPr>
+        <p:spPr>
+          <a:xfrm>
+            <a:off x="420480" y="2171520"/>
+            <a:ext cx="5980320" cy="762120"/>
+          </a:xfrm>
+          <a:prstGeom prst="rect">
+            <a:avLst/>
+          </a:prstGeom>
+          <a:noFill/>
+          <a:ln>
+            <a:noFill/>
+          </a:ln>
+        </p:spPr>
+        <p:txBody>
+          <a:bodyPr lIns="0" rIns="0" tIns="0" bIns="0" anchor="ctr"/>
+          <a:p>
+            <a:pPr algn="ctr"/>
+            <a:r>
+              <a:rPr b="0" lang="en-US" sz="3200" spc="-1" strike="noStrike">
+                <a:latin typeface="Arial"/>
+                <a:hlinkClick r:id="rId1"/>
+              </a:rPr>
+              <a:t>https://tools.ietf.org/html/rfc6819</a:t>
+            </a:r>
+            <a:endParaRPr b="0" lang="en-US" sz="3200" spc="-1" strike="noStrike">
+              <a:latin typeface="Arial"/>
+            </a:endParaRPr>
+          </a:p>
+          <a:p>
+            <a:pPr algn="ctr"/>
+            <a:endParaRPr b="0" lang="en-US" sz="3200" spc="-1" strike="noStrike">
+              <a:latin typeface="Arial"/>
+            </a:endParaRPr>
+          </a:p>
+        </p:txBody>
+      </p:sp>
+    </p:spTree>
+  </p:cSld>
+  <p:timing>
+    <p:tnLst>
+      <p:par>
+        <p:cTn id="17" dur="indefinite" restart="never" nodeType="tmRoot">
+          <p:childTnLst>
+            <p:seq>
+              <p:cTn id="18" dur="indefinite" nodeType="mainSeq"/>
               <p:prevCondLst>
                 <p:cond delay="0" evt="onPrev">
                   <p:tgtEl>

</xml_diff>